<commit_message>
remove some lines (gap) in between lines
</commit_message>
<xml_diff>
--- a/docs/Update_27Mar2020.pptx
+++ b/docs/Update_27Mar2020.pptx
@@ -110,7 +110,7 @@
   </p:defaultTextStyle>
   <p:extLst>
     <p:ext uri="{EFAFB233-063F-42B5-8137-9DF3F51BA10A}">
-      <p15:sldGuideLst xmlns:p15="http://schemas.microsoft.com/office/powerpoint/2012/main" xmlns="">
+      <p15:sldGuideLst xmlns:p15="http://schemas.microsoft.com/office/powerpoint/2012/main">
         <p15:guide id="1" orient="horz" pos="2160">
           <p15:clr>
             <a:srgbClr val="A4A3A4"/>
@@ -149,7 +149,7 @@
           <p:cNvPr id="2" name="Title 1">
             <a:extLst>
               <a:ext uri="{FF2B5EF4-FFF2-40B4-BE49-F238E27FC236}">
-                <a16:creationId xmlns:a16="http://schemas.microsoft.com/office/drawing/2014/main" xmlns="" id="{1E78CF75-C2FC-4CE4-B452-F11C2F3CAD2A}"/>
+                <a16:creationId xmlns:a16="http://schemas.microsoft.com/office/drawing/2014/main" id="{1E78CF75-C2FC-4CE4-B452-F11C2F3CAD2A}"/>
               </a:ext>
             </a:extLst>
           </p:cNvPr>
@@ -187,7 +187,7 @@
           <p:cNvPr id="3" name="Subtitle 2">
             <a:extLst>
               <a:ext uri="{FF2B5EF4-FFF2-40B4-BE49-F238E27FC236}">
-                <a16:creationId xmlns:a16="http://schemas.microsoft.com/office/drawing/2014/main" xmlns="" id="{3460B33A-2688-43F3-B3F0-640D798869B1}"/>
+                <a16:creationId xmlns:a16="http://schemas.microsoft.com/office/drawing/2014/main" id="{3460B33A-2688-43F3-B3F0-640D798869B1}"/>
               </a:ext>
             </a:extLst>
           </p:cNvPr>
@@ -258,7 +258,7 @@
           <p:cNvPr id="4" name="Date Placeholder 3">
             <a:extLst>
               <a:ext uri="{FF2B5EF4-FFF2-40B4-BE49-F238E27FC236}">
-                <a16:creationId xmlns:a16="http://schemas.microsoft.com/office/drawing/2014/main" xmlns="" id="{6A64E833-2166-4A55-91FA-218116E2EC77}"/>
+                <a16:creationId xmlns:a16="http://schemas.microsoft.com/office/drawing/2014/main" id="{6A64E833-2166-4A55-91FA-218116E2EC77}"/>
               </a:ext>
             </a:extLst>
           </p:cNvPr>
@@ -287,7 +287,7 @@
           <p:cNvPr id="5" name="Footer Placeholder 4">
             <a:extLst>
               <a:ext uri="{FF2B5EF4-FFF2-40B4-BE49-F238E27FC236}">
-                <a16:creationId xmlns:a16="http://schemas.microsoft.com/office/drawing/2014/main" xmlns="" id="{02C5652B-980A-48DE-8F3E-E043BE9A1C56}"/>
+                <a16:creationId xmlns:a16="http://schemas.microsoft.com/office/drawing/2014/main" id="{02C5652B-980A-48DE-8F3E-E043BE9A1C56}"/>
               </a:ext>
             </a:extLst>
           </p:cNvPr>
@@ -312,7 +312,7 @@
           <p:cNvPr id="6" name="Slide Number Placeholder 5">
             <a:extLst>
               <a:ext uri="{FF2B5EF4-FFF2-40B4-BE49-F238E27FC236}">
-                <a16:creationId xmlns:a16="http://schemas.microsoft.com/office/drawing/2014/main" xmlns="" id="{B6BDA15D-38FA-45F4-82C5-244AD1D691CE}"/>
+                <a16:creationId xmlns:a16="http://schemas.microsoft.com/office/drawing/2014/main" id="{B6BDA15D-38FA-45F4-82C5-244AD1D691CE}"/>
               </a:ext>
             </a:extLst>
           </p:cNvPr>
@@ -371,7 +371,7 @@
           <p:cNvPr id="2" name="Title 1">
             <a:extLst>
               <a:ext uri="{FF2B5EF4-FFF2-40B4-BE49-F238E27FC236}">
-                <a16:creationId xmlns:a16="http://schemas.microsoft.com/office/drawing/2014/main" xmlns="" id="{1A8FD9CD-5B12-4C49-B3ED-314EE3B4AEF1}"/>
+                <a16:creationId xmlns:a16="http://schemas.microsoft.com/office/drawing/2014/main" id="{1A8FD9CD-5B12-4C49-B3ED-314EE3B4AEF1}"/>
               </a:ext>
             </a:extLst>
           </p:cNvPr>
@@ -400,7 +400,7 @@
           <p:cNvPr id="3" name="Vertical Text Placeholder 2">
             <a:extLst>
               <a:ext uri="{FF2B5EF4-FFF2-40B4-BE49-F238E27FC236}">
-                <a16:creationId xmlns:a16="http://schemas.microsoft.com/office/drawing/2014/main" xmlns="" id="{74539DB5-57AF-4F9A-856C-262759C12054}"/>
+                <a16:creationId xmlns:a16="http://schemas.microsoft.com/office/drawing/2014/main" id="{74539DB5-57AF-4F9A-856C-262759C12054}"/>
               </a:ext>
             </a:extLst>
           </p:cNvPr>
@@ -458,7 +458,7 @@
           <p:cNvPr id="4" name="Date Placeholder 3">
             <a:extLst>
               <a:ext uri="{FF2B5EF4-FFF2-40B4-BE49-F238E27FC236}">
-                <a16:creationId xmlns:a16="http://schemas.microsoft.com/office/drawing/2014/main" xmlns="" id="{3B1AE4F1-94F3-42BC-AD6B-280D0472160D}"/>
+                <a16:creationId xmlns:a16="http://schemas.microsoft.com/office/drawing/2014/main" id="{3B1AE4F1-94F3-42BC-AD6B-280D0472160D}"/>
               </a:ext>
             </a:extLst>
           </p:cNvPr>
@@ -487,7 +487,7 @@
           <p:cNvPr id="5" name="Footer Placeholder 4">
             <a:extLst>
               <a:ext uri="{FF2B5EF4-FFF2-40B4-BE49-F238E27FC236}">
-                <a16:creationId xmlns:a16="http://schemas.microsoft.com/office/drawing/2014/main" xmlns="" id="{E7DCE1FB-3C25-451D-9035-575AA718CB97}"/>
+                <a16:creationId xmlns:a16="http://schemas.microsoft.com/office/drawing/2014/main" id="{E7DCE1FB-3C25-451D-9035-575AA718CB97}"/>
               </a:ext>
             </a:extLst>
           </p:cNvPr>
@@ -512,7 +512,7 @@
           <p:cNvPr id="6" name="Slide Number Placeholder 5">
             <a:extLst>
               <a:ext uri="{FF2B5EF4-FFF2-40B4-BE49-F238E27FC236}">
-                <a16:creationId xmlns:a16="http://schemas.microsoft.com/office/drawing/2014/main" xmlns="" id="{29857517-172E-460E-9CDA-2901211B8A43}"/>
+                <a16:creationId xmlns:a16="http://schemas.microsoft.com/office/drawing/2014/main" id="{29857517-172E-460E-9CDA-2901211B8A43}"/>
               </a:ext>
             </a:extLst>
           </p:cNvPr>
@@ -571,7 +571,7 @@
           <p:cNvPr id="2" name="Vertical Title 1">
             <a:extLst>
               <a:ext uri="{FF2B5EF4-FFF2-40B4-BE49-F238E27FC236}">
-                <a16:creationId xmlns:a16="http://schemas.microsoft.com/office/drawing/2014/main" xmlns="" id="{59B322C4-7763-44FF-A660-25457A24186F}"/>
+                <a16:creationId xmlns:a16="http://schemas.microsoft.com/office/drawing/2014/main" id="{59B322C4-7763-44FF-A660-25457A24186F}"/>
               </a:ext>
             </a:extLst>
           </p:cNvPr>
@@ -605,7 +605,7 @@
           <p:cNvPr id="3" name="Vertical Text Placeholder 2">
             <a:extLst>
               <a:ext uri="{FF2B5EF4-FFF2-40B4-BE49-F238E27FC236}">
-                <a16:creationId xmlns:a16="http://schemas.microsoft.com/office/drawing/2014/main" xmlns="" id="{331113DA-1DE1-4485-AF13-5B2CD8E51E04}"/>
+                <a16:creationId xmlns:a16="http://schemas.microsoft.com/office/drawing/2014/main" id="{331113DA-1DE1-4485-AF13-5B2CD8E51E04}"/>
               </a:ext>
             </a:extLst>
           </p:cNvPr>
@@ -668,7 +668,7 @@
           <p:cNvPr id="4" name="Date Placeholder 3">
             <a:extLst>
               <a:ext uri="{FF2B5EF4-FFF2-40B4-BE49-F238E27FC236}">
-                <a16:creationId xmlns:a16="http://schemas.microsoft.com/office/drawing/2014/main" xmlns="" id="{6841E282-CD5F-418D-B7D6-73CB4139F485}"/>
+                <a16:creationId xmlns:a16="http://schemas.microsoft.com/office/drawing/2014/main" id="{6841E282-CD5F-418D-B7D6-73CB4139F485}"/>
               </a:ext>
             </a:extLst>
           </p:cNvPr>
@@ -697,7 +697,7 @@
           <p:cNvPr id="5" name="Footer Placeholder 4">
             <a:extLst>
               <a:ext uri="{FF2B5EF4-FFF2-40B4-BE49-F238E27FC236}">
-                <a16:creationId xmlns:a16="http://schemas.microsoft.com/office/drawing/2014/main" xmlns="" id="{A728F281-5986-4AF4-BB11-2501F282CCD6}"/>
+                <a16:creationId xmlns:a16="http://schemas.microsoft.com/office/drawing/2014/main" id="{A728F281-5986-4AF4-BB11-2501F282CCD6}"/>
               </a:ext>
             </a:extLst>
           </p:cNvPr>
@@ -722,7 +722,7 @@
           <p:cNvPr id="6" name="Slide Number Placeholder 5">
             <a:extLst>
               <a:ext uri="{FF2B5EF4-FFF2-40B4-BE49-F238E27FC236}">
-                <a16:creationId xmlns:a16="http://schemas.microsoft.com/office/drawing/2014/main" xmlns="" id="{19CB3860-D4A3-4BBD-8084-488E66868054}"/>
+                <a16:creationId xmlns:a16="http://schemas.microsoft.com/office/drawing/2014/main" id="{19CB3860-D4A3-4BBD-8084-488E66868054}"/>
               </a:ext>
             </a:extLst>
           </p:cNvPr>
@@ -781,7 +781,7 @@
           <p:cNvPr id="2" name="Title 1">
             <a:extLst>
               <a:ext uri="{FF2B5EF4-FFF2-40B4-BE49-F238E27FC236}">
-                <a16:creationId xmlns:a16="http://schemas.microsoft.com/office/drawing/2014/main" xmlns="" id="{D119B07F-59F9-4FC9-81C0-CE1AAD87443E}"/>
+                <a16:creationId xmlns:a16="http://schemas.microsoft.com/office/drawing/2014/main" id="{D119B07F-59F9-4FC9-81C0-CE1AAD87443E}"/>
               </a:ext>
             </a:extLst>
           </p:cNvPr>
@@ -815,7 +815,7 @@
           <p:cNvPr id="3" name="Content Placeholder 2">
             <a:extLst>
               <a:ext uri="{FF2B5EF4-FFF2-40B4-BE49-F238E27FC236}">
-                <a16:creationId xmlns:a16="http://schemas.microsoft.com/office/drawing/2014/main" xmlns="" id="{85D5EFBE-E73A-4B69-8567-F864C97949F2}"/>
+                <a16:creationId xmlns:a16="http://schemas.microsoft.com/office/drawing/2014/main" id="{85D5EFBE-E73A-4B69-8567-F864C97949F2}"/>
               </a:ext>
             </a:extLst>
           </p:cNvPr>
@@ -878,7 +878,7 @@
           <p:cNvPr id="4" name="Date Placeholder 3">
             <a:extLst>
               <a:ext uri="{FF2B5EF4-FFF2-40B4-BE49-F238E27FC236}">
-                <a16:creationId xmlns:a16="http://schemas.microsoft.com/office/drawing/2014/main" xmlns="" id="{7B28E07E-F4CC-4131-9EFE-EC749462857F}"/>
+                <a16:creationId xmlns:a16="http://schemas.microsoft.com/office/drawing/2014/main" id="{7B28E07E-F4CC-4131-9EFE-EC749462857F}"/>
               </a:ext>
             </a:extLst>
           </p:cNvPr>
@@ -907,7 +907,7 @@
           <p:cNvPr id="5" name="Footer Placeholder 4">
             <a:extLst>
               <a:ext uri="{FF2B5EF4-FFF2-40B4-BE49-F238E27FC236}">
-                <a16:creationId xmlns:a16="http://schemas.microsoft.com/office/drawing/2014/main" xmlns="" id="{0DE0E6C7-82AA-45A7-9479-9F488F060BEE}"/>
+                <a16:creationId xmlns:a16="http://schemas.microsoft.com/office/drawing/2014/main" id="{0DE0E6C7-82AA-45A7-9479-9F488F060BEE}"/>
               </a:ext>
             </a:extLst>
           </p:cNvPr>
@@ -932,7 +932,7 @@
           <p:cNvPr id="6" name="Slide Number Placeholder 5">
             <a:extLst>
               <a:ext uri="{FF2B5EF4-FFF2-40B4-BE49-F238E27FC236}">
-                <a16:creationId xmlns:a16="http://schemas.microsoft.com/office/drawing/2014/main" xmlns="" id="{1BE0699D-8392-4B84-AB3A-BC422A4C18B0}"/>
+                <a16:creationId xmlns:a16="http://schemas.microsoft.com/office/drawing/2014/main" id="{1BE0699D-8392-4B84-AB3A-BC422A4C18B0}"/>
               </a:ext>
             </a:extLst>
           </p:cNvPr>
@@ -991,7 +991,7 @@
           <p:cNvPr id="2" name="Title 1">
             <a:extLst>
               <a:ext uri="{FF2B5EF4-FFF2-40B4-BE49-F238E27FC236}">
-                <a16:creationId xmlns:a16="http://schemas.microsoft.com/office/drawing/2014/main" xmlns="" id="{28860B17-99D5-4175-89C5-4A4ACBCF15AF}"/>
+                <a16:creationId xmlns:a16="http://schemas.microsoft.com/office/drawing/2014/main" id="{28860B17-99D5-4175-89C5-4A4ACBCF15AF}"/>
               </a:ext>
             </a:extLst>
           </p:cNvPr>
@@ -1029,7 +1029,7 @@
           <p:cNvPr id="3" name="Text Placeholder 2">
             <a:extLst>
               <a:ext uri="{FF2B5EF4-FFF2-40B4-BE49-F238E27FC236}">
-                <a16:creationId xmlns:a16="http://schemas.microsoft.com/office/drawing/2014/main" xmlns="" id="{3CB4447C-4382-42B4-98A2-40EF6E3B3B2D}"/>
+                <a16:creationId xmlns:a16="http://schemas.microsoft.com/office/drawing/2014/main" id="{3CB4447C-4382-42B4-98A2-40EF6E3B3B2D}"/>
               </a:ext>
             </a:extLst>
           </p:cNvPr>
@@ -1154,7 +1154,7 @@
           <p:cNvPr id="4" name="Date Placeholder 3">
             <a:extLst>
               <a:ext uri="{FF2B5EF4-FFF2-40B4-BE49-F238E27FC236}">
-                <a16:creationId xmlns:a16="http://schemas.microsoft.com/office/drawing/2014/main" xmlns="" id="{77B7F673-72FB-470D-814C-9279741463AE}"/>
+                <a16:creationId xmlns:a16="http://schemas.microsoft.com/office/drawing/2014/main" id="{77B7F673-72FB-470D-814C-9279741463AE}"/>
               </a:ext>
             </a:extLst>
           </p:cNvPr>
@@ -1183,7 +1183,7 @@
           <p:cNvPr id="5" name="Footer Placeholder 4">
             <a:extLst>
               <a:ext uri="{FF2B5EF4-FFF2-40B4-BE49-F238E27FC236}">
-                <a16:creationId xmlns:a16="http://schemas.microsoft.com/office/drawing/2014/main" xmlns="" id="{9B999FA6-55AF-4C57-96B7-051870F34D3A}"/>
+                <a16:creationId xmlns:a16="http://schemas.microsoft.com/office/drawing/2014/main" id="{9B999FA6-55AF-4C57-96B7-051870F34D3A}"/>
               </a:ext>
             </a:extLst>
           </p:cNvPr>
@@ -1208,7 +1208,7 @@
           <p:cNvPr id="6" name="Slide Number Placeholder 5">
             <a:extLst>
               <a:ext uri="{FF2B5EF4-FFF2-40B4-BE49-F238E27FC236}">
-                <a16:creationId xmlns:a16="http://schemas.microsoft.com/office/drawing/2014/main" xmlns="" id="{D1D06210-F1E5-4221-B5F6-00EBF45C6FFA}"/>
+                <a16:creationId xmlns:a16="http://schemas.microsoft.com/office/drawing/2014/main" id="{D1D06210-F1E5-4221-B5F6-00EBF45C6FFA}"/>
               </a:ext>
             </a:extLst>
           </p:cNvPr>
@@ -1267,7 +1267,7 @@
           <p:cNvPr id="2" name="Title 1">
             <a:extLst>
               <a:ext uri="{FF2B5EF4-FFF2-40B4-BE49-F238E27FC236}">
-                <a16:creationId xmlns:a16="http://schemas.microsoft.com/office/drawing/2014/main" xmlns="" id="{8BFFC664-487A-4A70-B46E-EB089C868748}"/>
+                <a16:creationId xmlns:a16="http://schemas.microsoft.com/office/drawing/2014/main" id="{8BFFC664-487A-4A70-B46E-EB089C868748}"/>
               </a:ext>
             </a:extLst>
           </p:cNvPr>
@@ -1296,7 +1296,7 @@
           <p:cNvPr id="3" name="Content Placeholder 2">
             <a:extLst>
               <a:ext uri="{FF2B5EF4-FFF2-40B4-BE49-F238E27FC236}">
-                <a16:creationId xmlns:a16="http://schemas.microsoft.com/office/drawing/2014/main" xmlns="" id="{149D28A0-426F-446D-9EF7-21025A167690}"/>
+                <a16:creationId xmlns:a16="http://schemas.microsoft.com/office/drawing/2014/main" id="{149D28A0-426F-446D-9EF7-21025A167690}"/>
               </a:ext>
             </a:extLst>
           </p:cNvPr>
@@ -1359,7 +1359,7 @@
           <p:cNvPr id="4" name="Content Placeholder 3">
             <a:extLst>
               <a:ext uri="{FF2B5EF4-FFF2-40B4-BE49-F238E27FC236}">
-                <a16:creationId xmlns:a16="http://schemas.microsoft.com/office/drawing/2014/main" xmlns="" id="{E7925E0E-22C7-4C50-B1E2-E55D75C2419D}"/>
+                <a16:creationId xmlns:a16="http://schemas.microsoft.com/office/drawing/2014/main" id="{E7925E0E-22C7-4C50-B1E2-E55D75C2419D}"/>
               </a:ext>
             </a:extLst>
           </p:cNvPr>
@@ -1422,7 +1422,7 @@
           <p:cNvPr id="5" name="Date Placeholder 4">
             <a:extLst>
               <a:ext uri="{FF2B5EF4-FFF2-40B4-BE49-F238E27FC236}">
-                <a16:creationId xmlns:a16="http://schemas.microsoft.com/office/drawing/2014/main" xmlns="" id="{57036464-D97D-4521-9B63-036FEF9EC14C}"/>
+                <a16:creationId xmlns:a16="http://schemas.microsoft.com/office/drawing/2014/main" id="{57036464-D97D-4521-9B63-036FEF9EC14C}"/>
               </a:ext>
             </a:extLst>
           </p:cNvPr>
@@ -1451,7 +1451,7 @@
           <p:cNvPr id="6" name="Footer Placeholder 5">
             <a:extLst>
               <a:ext uri="{FF2B5EF4-FFF2-40B4-BE49-F238E27FC236}">
-                <a16:creationId xmlns:a16="http://schemas.microsoft.com/office/drawing/2014/main" xmlns="" id="{A72F7925-E947-4C4E-B53F-2BBC14F0EFFB}"/>
+                <a16:creationId xmlns:a16="http://schemas.microsoft.com/office/drawing/2014/main" id="{A72F7925-E947-4C4E-B53F-2BBC14F0EFFB}"/>
               </a:ext>
             </a:extLst>
           </p:cNvPr>
@@ -1476,7 +1476,7 @@
           <p:cNvPr id="7" name="Slide Number Placeholder 6">
             <a:extLst>
               <a:ext uri="{FF2B5EF4-FFF2-40B4-BE49-F238E27FC236}">
-                <a16:creationId xmlns:a16="http://schemas.microsoft.com/office/drawing/2014/main" xmlns="" id="{FE02781B-D73B-4BE5-99B5-9BE50BD9268B}"/>
+                <a16:creationId xmlns:a16="http://schemas.microsoft.com/office/drawing/2014/main" id="{FE02781B-D73B-4BE5-99B5-9BE50BD9268B}"/>
               </a:ext>
             </a:extLst>
           </p:cNvPr>
@@ -1535,7 +1535,7 @@
           <p:cNvPr id="2" name="Title 1">
             <a:extLst>
               <a:ext uri="{FF2B5EF4-FFF2-40B4-BE49-F238E27FC236}">
-                <a16:creationId xmlns:a16="http://schemas.microsoft.com/office/drawing/2014/main" xmlns="" id="{26B2C40A-1A9E-4C03-962E-4352531D590E}"/>
+                <a16:creationId xmlns:a16="http://schemas.microsoft.com/office/drawing/2014/main" id="{26B2C40A-1A9E-4C03-962E-4352531D590E}"/>
               </a:ext>
             </a:extLst>
           </p:cNvPr>
@@ -1569,7 +1569,7 @@
           <p:cNvPr id="3" name="Text Placeholder 2">
             <a:extLst>
               <a:ext uri="{FF2B5EF4-FFF2-40B4-BE49-F238E27FC236}">
-                <a16:creationId xmlns:a16="http://schemas.microsoft.com/office/drawing/2014/main" xmlns="" id="{EE11FFD1-E770-488C-913A-817613001E39}"/>
+                <a16:creationId xmlns:a16="http://schemas.microsoft.com/office/drawing/2014/main" id="{EE11FFD1-E770-488C-913A-817613001E39}"/>
               </a:ext>
             </a:extLst>
           </p:cNvPr>
@@ -1640,7 +1640,7 @@
           <p:cNvPr id="4" name="Content Placeholder 3">
             <a:extLst>
               <a:ext uri="{FF2B5EF4-FFF2-40B4-BE49-F238E27FC236}">
-                <a16:creationId xmlns:a16="http://schemas.microsoft.com/office/drawing/2014/main" xmlns="" id="{948B8DF4-FD09-4665-AAB1-E7F8C85B98D6}"/>
+                <a16:creationId xmlns:a16="http://schemas.microsoft.com/office/drawing/2014/main" id="{948B8DF4-FD09-4665-AAB1-E7F8C85B98D6}"/>
               </a:ext>
             </a:extLst>
           </p:cNvPr>
@@ -1703,7 +1703,7 @@
           <p:cNvPr id="5" name="Text Placeholder 4">
             <a:extLst>
               <a:ext uri="{FF2B5EF4-FFF2-40B4-BE49-F238E27FC236}">
-                <a16:creationId xmlns:a16="http://schemas.microsoft.com/office/drawing/2014/main" xmlns="" id="{03DB36B6-321E-4089-9B1D-746055B66B99}"/>
+                <a16:creationId xmlns:a16="http://schemas.microsoft.com/office/drawing/2014/main" id="{03DB36B6-321E-4089-9B1D-746055B66B99}"/>
               </a:ext>
             </a:extLst>
           </p:cNvPr>
@@ -1774,7 +1774,7 @@
           <p:cNvPr id="6" name="Content Placeholder 5">
             <a:extLst>
               <a:ext uri="{FF2B5EF4-FFF2-40B4-BE49-F238E27FC236}">
-                <a16:creationId xmlns:a16="http://schemas.microsoft.com/office/drawing/2014/main" xmlns="" id="{E082D31C-A998-4505-A94F-06751C9325AB}"/>
+                <a16:creationId xmlns:a16="http://schemas.microsoft.com/office/drawing/2014/main" id="{E082D31C-A998-4505-A94F-06751C9325AB}"/>
               </a:ext>
             </a:extLst>
           </p:cNvPr>
@@ -1837,7 +1837,7 @@
           <p:cNvPr id="7" name="Date Placeholder 6">
             <a:extLst>
               <a:ext uri="{FF2B5EF4-FFF2-40B4-BE49-F238E27FC236}">
-                <a16:creationId xmlns:a16="http://schemas.microsoft.com/office/drawing/2014/main" xmlns="" id="{C3EA214D-E04E-4BD1-8F20-C3CFDCF3EEFC}"/>
+                <a16:creationId xmlns:a16="http://schemas.microsoft.com/office/drawing/2014/main" id="{C3EA214D-E04E-4BD1-8F20-C3CFDCF3EEFC}"/>
               </a:ext>
             </a:extLst>
           </p:cNvPr>
@@ -1866,7 +1866,7 @@
           <p:cNvPr id="8" name="Footer Placeholder 7">
             <a:extLst>
               <a:ext uri="{FF2B5EF4-FFF2-40B4-BE49-F238E27FC236}">
-                <a16:creationId xmlns:a16="http://schemas.microsoft.com/office/drawing/2014/main" xmlns="" id="{62E94A67-00CB-4587-9423-8068907870E3}"/>
+                <a16:creationId xmlns:a16="http://schemas.microsoft.com/office/drawing/2014/main" id="{62E94A67-00CB-4587-9423-8068907870E3}"/>
               </a:ext>
             </a:extLst>
           </p:cNvPr>
@@ -1891,7 +1891,7 @@
           <p:cNvPr id="9" name="Slide Number Placeholder 8">
             <a:extLst>
               <a:ext uri="{FF2B5EF4-FFF2-40B4-BE49-F238E27FC236}">
-                <a16:creationId xmlns:a16="http://schemas.microsoft.com/office/drawing/2014/main" xmlns="" id="{8E997082-8BAB-4A30-B61A-0E956B938D8F}"/>
+                <a16:creationId xmlns:a16="http://schemas.microsoft.com/office/drawing/2014/main" id="{8E997082-8BAB-4A30-B61A-0E956B938D8F}"/>
               </a:ext>
             </a:extLst>
           </p:cNvPr>
@@ -1950,7 +1950,7 @@
           <p:cNvPr id="2" name="Title 1">
             <a:extLst>
               <a:ext uri="{FF2B5EF4-FFF2-40B4-BE49-F238E27FC236}">
-                <a16:creationId xmlns:a16="http://schemas.microsoft.com/office/drawing/2014/main" xmlns="" id="{DE81B467-2EE4-462A-8043-AF60A7D0BAF4}"/>
+                <a16:creationId xmlns:a16="http://schemas.microsoft.com/office/drawing/2014/main" id="{DE81B467-2EE4-462A-8043-AF60A7D0BAF4}"/>
               </a:ext>
             </a:extLst>
           </p:cNvPr>
@@ -1979,7 +1979,7 @@
           <p:cNvPr id="3" name="Date Placeholder 2">
             <a:extLst>
               <a:ext uri="{FF2B5EF4-FFF2-40B4-BE49-F238E27FC236}">
-                <a16:creationId xmlns:a16="http://schemas.microsoft.com/office/drawing/2014/main" xmlns="" id="{FBFA6204-B265-42E9-BA33-04B24A2310EE}"/>
+                <a16:creationId xmlns:a16="http://schemas.microsoft.com/office/drawing/2014/main" id="{FBFA6204-B265-42E9-BA33-04B24A2310EE}"/>
               </a:ext>
             </a:extLst>
           </p:cNvPr>
@@ -2008,7 +2008,7 @@
           <p:cNvPr id="4" name="Footer Placeholder 3">
             <a:extLst>
               <a:ext uri="{FF2B5EF4-FFF2-40B4-BE49-F238E27FC236}">
-                <a16:creationId xmlns:a16="http://schemas.microsoft.com/office/drawing/2014/main" xmlns="" id="{9C11814F-9234-4C0A-8E31-D1AE2BB7A9B5}"/>
+                <a16:creationId xmlns:a16="http://schemas.microsoft.com/office/drawing/2014/main" id="{9C11814F-9234-4C0A-8E31-D1AE2BB7A9B5}"/>
               </a:ext>
             </a:extLst>
           </p:cNvPr>
@@ -2033,7 +2033,7 @@
           <p:cNvPr id="5" name="Slide Number Placeholder 4">
             <a:extLst>
               <a:ext uri="{FF2B5EF4-FFF2-40B4-BE49-F238E27FC236}">
-                <a16:creationId xmlns:a16="http://schemas.microsoft.com/office/drawing/2014/main" xmlns="" id="{682B9AB5-C539-4F36-9D12-2CEA80FC83E0}"/>
+                <a16:creationId xmlns:a16="http://schemas.microsoft.com/office/drawing/2014/main" id="{682B9AB5-C539-4F36-9D12-2CEA80FC83E0}"/>
               </a:ext>
             </a:extLst>
           </p:cNvPr>
@@ -2092,7 +2092,7 @@
           <p:cNvPr id="2" name="Date Placeholder 1">
             <a:extLst>
               <a:ext uri="{FF2B5EF4-FFF2-40B4-BE49-F238E27FC236}">
-                <a16:creationId xmlns:a16="http://schemas.microsoft.com/office/drawing/2014/main" xmlns="" id="{DA1FEC02-C5CD-449E-8667-012193689055}"/>
+                <a16:creationId xmlns:a16="http://schemas.microsoft.com/office/drawing/2014/main" id="{DA1FEC02-C5CD-449E-8667-012193689055}"/>
               </a:ext>
             </a:extLst>
           </p:cNvPr>
@@ -2121,7 +2121,7 @@
           <p:cNvPr id="3" name="Footer Placeholder 2">
             <a:extLst>
               <a:ext uri="{FF2B5EF4-FFF2-40B4-BE49-F238E27FC236}">
-                <a16:creationId xmlns:a16="http://schemas.microsoft.com/office/drawing/2014/main" xmlns="" id="{F49D3241-2CF1-478C-A392-D892DFD40B22}"/>
+                <a16:creationId xmlns:a16="http://schemas.microsoft.com/office/drawing/2014/main" id="{F49D3241-2CF1-478C-A392-D892DFD40B22}"/>
               </a:ext>
             </a:extLst>
           </p:cNvPr>
@@ -2146,7 +2146,7 @@
           <p:cNvPr id="4" name="Slide Number Placeholder 3">
             <a:extLst>
               <a:ext uri="{FF2B5EF4-FFF2-40B4-BE49-F238E27FC236}">
-                <a16:creationId xmlns:a16="http://schemas.microsoft.com/office/drawing/2014/main" xmlns="" id="{CBEE0FDB-6307-4141-A127-B382F7DF7A43}"/>
+                <a16:creationId xmlns:a16="http://schemas.microsoft.com/office/drawing/2014/main" id="{CBEE0FDB-6307-4141-A127-B382F7DF7A43}"/>
               </a:ext>
             </a:extLst>
           </p:cNvPr>
@@ -2205,7 +2205,7 @@
           <p:cNvPr id="2" name="Title 1">
             <a:extLst>
               <a:ext uri="{FF2B5EF4-FFF2-40B4-BE49-F238E27FC236}">
-                <a16:creationId xmlns:a16="http://schemas.microsoft.com/office/drawing/2014/main" xmlns="" id="{B8B327B1-09E2-4E8D-90E2-0B5309E92843}"/>
+                <a16:creationId xmlns:a16="http://schemas.microsoft.com/office/drawing/2014/main" id="{B8B327B1-09E2-4E8D-90E2-0B5309E92843}"/>
               </a:ext>
             </a:extLst>
           </p:cNvPr>
@@ -2243,7 +2243,7 @@
           <p:cNvPr id="3" name="Content Placeholder 2">
             <a:extLst>
               <a:ext uri="{FF2B5EF4-FFF2-40B4-BE49-F238E27FC236}">
-                <a16:creationId xmlns:a16="http://schemas.microsoft.com/office/drawing/2014/main" xmlns="" id="{52DEBDDA-E1D2-4C53-8CEA-9B93BB343DC3}"/>
+                <a16:creationId xmlns:a16="http://schemas.microsoft.com/office/drawing/2014/main" id="{52DEBDDA-E1D2-4C53-8CEA-9B93BB343DC3}"/>
               </a:ext>
             </a:extLst>
           </p:cNvPr>
@@ -2334,7 +2334,7 @@
           <p:cNvPr id="4" name="Text Placeholder 3">
             <a:extLst>
               <a:ext uri="{FF2B5EF4-FFF2-40B4-BE49-F238E27FC236}">
-                <a16:creationId xmlns:a16="http://schemas.microsoft.com/office/drawing/2014/main" xmlns="" id="{E35107A8-5597-442D-9467-C7AB6D95C56F}"/>
+                <a16:creationId xmlns:a16="http://schemas.microsoft.com/office/drawing/2014/main" id="{E35107A8-5597-442D-9467-C7AB6D95C56F}"/>
               </a:ext>
             </a:extLst>
           </p:cNvPr>
@@ -2405,7 +2405,7 @@
           <p:cNvPr id="5" name="Date Placeholder 4">
             <a:extLst>
               <a:ext uri="{FF2B5EF4-FFF2-40B4-BE49-F238E27FC236}">
-                <a16:creationId xmlns:a16="http://schemas.microsoft.com/office/drawing/2014/main" xmlns="" id="{C02660C0-B8E6-4542-9A2B-4311867DE5B1}"/>
+                <a16:creationId xmlns:a16="http://schemas.microsoft.com/office/drawing/2014/main" id="{C02660C0-B8E6-4542-9A2B-4311867DE5B1}"/>
               </a:ext>
             </a:extLst>
           </p:cNvPr>
@@ -2434,7 +2434,7 @@
           <p:cNvPr id="6" name="Footer Placeholder 5">
             <a:extLst>
               <a:ext uri="{FF2B5EF4-FFF2-40B4-BE49-F238E27FC236}">
-                <a16:creationId xmlns:a16="http://schemas.microsoft.com/office/drawing/2014/main" xmlns="" id="{C6100ADB-3F33-4032-A965-657FAF26C20D}"/>
+                <a16:creationId xmlns:a16="http://schemas.microsoft.com/office/drawing/2014/main" id="{C6100ADB-3F33-4032-A965-657FAF26C20D}"/>
               </a:ext>
             </a:extLst>
           </p:cNvPr>
@@ -2459,7 +2459,7 @@
           <p:cNvPr id="7" name="Slide Number Placeholder 6">
             <a:extLst>
               <a:ext uri="{FF2B5EF4-FFF2-40B4-BE49-F238E27FC236}">
-                <a16:creationId xmlns:a16="http://schemas.microsoft.com/office/drawing/2014/main" xmlns="" id="{A36A0A56-C2A1-4558-ACE2-1EFBAB377E33}"/>
+                <a16:creationId xmlns:a16="http://schemas.microsoft.com/office/drawing/2014/main" id="{A36A0A56-C2A1-4558-ACE2-1EFBAB377E33}"/>
               </a:ext>
             </a:extLst>
           </p:cNvPr>
@@ -2518,7 +2518,7 @@
           <p:cNvPr id="2" name="Title 1">
             <a:extLst>
               <a:ext uri="{FF2B5EF4-FFF2-40B4-BE49-F238E27FC236}">
-                <a16:creationId xmlns:a16="http://schemas.microsoft.com/office/drawing/2014/main" xmlns="" id="{278A620C-D64F-4B66-8B58-BF40048AD556}"/>
+                <a16:creationId xmlns:a16="http://schemas.microsoft.com/office/drawing/2014/main" id="{278A620C-D64F-4B66-8B58-BF40048AD556}"/>
               </a:ext>
             </a:extLst>
           </p:cNvPr>
@@ -2556,7 +2556,7 @@
           <p:cNvPr id="3" name="Picture Placeholder 2">
             <a:extLst>
               <a:ext uri="{FF2B5EF4-FFF2-40B4-BE49-F238E27FC236}">
-                <a16:creationId xmlns:a16="http://schemas.microsoft.com/office/drawing/2014/main" xmlns="" id="{832A385B-4791-4E41-A615-E046942A88E8}"/>
+                <a16:creationId xmlns:a16="http://schemas.microsoft.com/office/drawing/2014/main" id="{832A385B-4791-4E41-A615-E046942A88E8}"/>
               </a:ext>
             </a:extLst>
           </p:cNvPr>
@@ -2623,7 +2623,7 @@
           <p:cNvPr id="4" name="Text Placeholder 3">
             <a:extLst>
               <a:ext uri="{FF2B5EF4-FFF2-40B4-BE49-F238E27FC236}">
-                <a16:creationId xmlns:a16="http://schemas.microsoft.com/office/drawing/2014/main" xmlns="" id="{C620033E-EAC5-44B6-98F7-8AF5A8943F47}"/>
+                <a16:creationId xmlns:a16="http://schemas.microsoft.com/office/drawing/2014/main" id="{C620033E-EAC5-44B6-98F7-8AF5A8943F47}"/>
               </a:ext>
             </a:extLst>
           </p:cNvPr>
@@ -2694,7 +2694,7 @@
           <p:cNvPr id="5" name="Date Placeholder 4">
             <a:extLst>
               <a:ext uri="{FF2B5EF4-FFF2-40B4-BE49-F238E27FC236}">
-                <a16:creationId xmlns:a16="http://schemas.microsoft.com/office/drawing/2014/main" xmlns="" id="{75583297-63AE-4B35-885B-21E127919E53}"/>
+                <a16:creationId xmlns:a16="http://schemas.microsoft.com/office/drawing/2014/main" id="{75583297-63AE-4B35-885B-21E127919E53}"/>
               </a:ext>
             </a:extLst>
           </p:cNvPr>
@@ -2723,7 +2723,7 @@
           <p:cNvPr id="6" name="Footer Placeholder 5">
             <a:extLst>
               <a:ext uri="{FF2B5EF4-FFF2-40B4-BE49-F238E27FC236}">
-                <a16:creationId xmlns:a16="http://schemas.microsoft.com/office/drawing/2014/main" xmlns="" id="{DD82C2CF-FE35-4A7F-873A-E97136F11844}"/>
+                <a16:creationId xmlns:a16="http://schemas.microsoft.com/office/drawing/2014/main" id="{DD82C2CF-FE35-4A7F-873A-E97136F11844}"/>
               </a:ext>
             </a:extLst>
           </p:cNvPr>
@@ -2748,7 +2748,7 @@
           <p:cNvPr id="7" name="Slide Number Placeholder 6">
             <a:extLst>
               <a:ext uri="{FF2B5EF4-FFF2-40B4-BE49-F238E27FC236}">
-                <a16:creationId xmlns:a16="http://schemas.microsoft.com/office/drawing/2014/main" xmlns="" id="{3020967D-63BA-4F40-B1A1-A9AC7DB88F32}"/>
+                <a16:creationId xmlns:a16="http://schemas.microsoft.com/office/drawing/2014/main" id="{3020967D-63BA-4F40-B1A1-A9AC7DB88F32}"/>
               </a:ext>
             </a:extLst>
           </p:cNvPr>
@@ -2812,7 +2812,7 @@
           <p:cNvPr id="2" name="Title Placeholder 1">
             <a:extLst>
               <a:ext uri="{FF2B5EF4-FFF2-40B4-BE49-F238E27FC236}">
-                <a16:creationId xmlns:a16="http://schemas.microsoft.com/office/drawing/2014/main" xmlns="" id="{B0A9C9EB-2A9B-4353-B518-C3F4E816CC53}"/>
+                <a16:creationId xmlns:a16="http://schemas.microsoft.com/office/drawing/2014/main" id="{B0A9C9EB-2A9B-4353-B518-C3F4E816CC53}"/>
               </a:ext>
             </a:extLst>
           </p:cNvPr>
@@ -2851,7 +2851,7 @@
           <p:cNvPr id="3" name="Text Placeholder 2">
             <a:extLst>
               <a:ext uri="{FF2B5EF4-FFF2-40B4-BE49-F238E27FC236}">
-                <a16:creationId xmlns:a16="http://schemas.microsoft.com/office/drawing/2014/main" xmlns="" id="{97653011-F866-4B26-AAAC-D835461C1CBC}"/>
+                <a16:creationId xmlns:a16="http://schemas.microsoft.com/office/drawing/2014/main" id="{97653011-F866-4B26-AAAC-D835461C1CBC}"/>
               </a:ext>
             </a:extLst>
           </p:cNvPr>
@@ -2919,7 +2919,7 @@
           <p:cNvPr id="4" name="Date Placeholder 3">
             <a:extLst>
               <a:ext uri="{FF2B5EF4-FFF2-40B4-BE49-F238E27FC236}">
-                <a16:creationId xmlns:a16="http://schemas.microsoft.com/office/drawing/2014/main" xmlns="" id="{0866146B-048B-412C-89CC-8874A0984C3E}"/>
+                <a16:creationId xmlns:a16="http://schemas.microsoft.com/office/drawing/2014/main" id="{0866146B-048B-412C-89CC-8874A0984C3E}"/>
               </a:ext>
             </a:extLst>
           </p:cNvPr>
@@ -2966,7 +2966,7 @@
           <p:cNvPr id="5" name="Footer Placeholder 4">
             <a:extLst>
               <a:ext uri="{FF2B5EF4-FFF2-40B4-BE49-F238E27FC236}">
-                <a16:creationId xmlns:a16="http://schemas.microsoft.com/office/drawing/2014/main" xmlns="" id="{0D8B8012-9236-404E-B5C2-AAF84D2F24F1}"/>
+                <a16:creationId xmlns:a16="http://schemas.microsoft.com/office/drawing/2014/main" id="{0D8B8012-9236-404E-B5C2-AAF84D2F24F1}"/>
               </a:ext>
             </a:extLst>
           </p:cNvPr>
@@ -3009,7 +3009,7 @@
           <p:cNvPr id="6" name="Slide Number Placeholder 5">
             <a:extLst>
               <a:ext uri="{FF2B5EF4-FFF2-40B4-BE49-F238E27FC236}">
-                <a16:creationId xmlns:a16="http://schemas.microsoft.com/office/drawing/2014/main" xmlns="" id="{F99D323F-1C65-4348-AB73-24BDAB4FED98}"/>
+                <a16:creationId xmlns:a16="http://schemas.microsoft.com/office/drawing/2014/main" id="{F99D323F-1C65-4348-AB73-24BDAB4FED98}"/>
               </a:ext>
             </a:extLst>
           </p:cNvPr>
@@ -3377,7 +3377,7 @@
           <p:cNvPr id="2" name="Title 1">
             <a:extLst>
               <a:ext uri="{FF2B5EF4-FFF2-40B4-BE49-F238E27FC236}">
-                <a16:creationId xmlns:a16="http://schemas.microsoft.com/office/drawing/2014/main" xmlns="" id="{357490B8-9F1F-49BC-9DB9-4F35748170B5}"/>
+                <a16:creationId xmlns:a16="http://schemas.microsoft.com/office/drawing/2014/main" id="{357490B8-9F1F-49BC-9DB9-4F35748170B5}"/>
               </a:ext>
             </a:extLst>
           </p:cNvPr>
@@ -3421,7 +3421,7 @@
           <p:cNvPr id="3" name="Subtitle 2">
             <a:extLst>
               <a:ext uri="{FF2B5EF4-FFF2-40B4-BE49-F238E27FC236}">
-                <a16:creationId xmlns:a16="http://schemas.microsoft.com/office/drawing/2014/main" xmlns="" id="{5FDF69D4-5210-4CD1-B5E4-8D081B7FDA17}"/>
+                <a16:creationId xmlns:a16="http://schemas.microsoft.com/office/drawing/2014/main" id="{5FDF69D4-5210-4CD1-B5E4-8D081B7FDA17}"/>
               </a:ext>
             </a:extLst>
           </p:cNvPr>
@@ -3443,20 +3443,16 @@
           <a:lstStyle/>
           <a:p>
             <a:r>
-              <a:rPr lang="en-SG" dirty="0" smtClean="0"/>
+              <a:rPr lang="en-SG" dirty="0"/>
               <a:t>27</a:t>
             </a:r>
             <a:r>
-              <a:rPr lang="en-SG" baseline="30000" dirty="0" smtClean="0"/>
+              <a:rPr lang="en-SG" baseline="30000" dirty="0"/>
               <a:t>th</a:t>
             </a:r>
             <a:r>
-              <a:rPr lang="en-SG" dirty="0" smtClean="0"/>
-              <a:t> </a:t>
-            </a:r>
-            <a:r>
               <a:rPr lang="en-SG" dirty="0"/>
-              <a:t>March 2020</a:t>
+              <a:t> March 2020</a:t>
             </a:r>
           </a:p>
         </p:txBody>
@@ -3508,13 +3504,8 @@
           <a:p>
             <a:r>
               <a:rPr lang="en-SG" dirty="0"/>
-              <a:t>Things we have </a:t>
-            </a:r>
-            <a:r>
-              <a:rPr lang="en-SG" dirty="0" smtClean="0"/>
-              <a:t>done this week</a:t>
-            </a:r>
-            <a:endParaRPr lang="en-SG" dirty="0"/>
+              <a:t>Things we have done this week</a:t>
+            </a:r>
           </a:p>
         </p:txBody>
       </p:sp>
@@ -3537,7 +3528,7 @@
               <a:buAutoNum type="arabicParenR"/>
             </a:pPr>
             <a:r>
-              <a:rPr lang="en-SG" dirty="0" smtClean="0"/>
+              <a:rPr lang="en-SG" dirty="0"/>
               <a:t>Refine our code to make things smooth, we work on each others feedback and inputs</a:t>
             </a:r>
           </a:p>
@@ -3546,7 +3537,7 @@
               <a:buAutoNum type="arabicParenR"/>
             </a:pPr>
             <a:r>
-              <a:rPr lang="en-SG" dirty="0" smtClean="0"/>
+              <a:rPr lang="en-SG" dirty="0"/>
               <a:t>Research on evaluation methods, BLEU and ROUGE</a:t>
             </a:r>
           </a:p>
@@ -3555,14 +3546,14 @@
               <a:buAutoNum type="arabicParenR"/>
             </a:pPr>
             <a:r>
-              <a:rPr lang="en-SG" dirty="0" smtClean="0"/>
+              <a:rPr lang="en-SG" dirty="0"/>
               <a:t>Research on fine tuning the BERT model but found it challenging,</a:t>
             </a:r>
             <a:br>
-              <a:rPr lang="en-SG" dirty="0" smtClean="0"/>
+              <a:rPr lang="en-SG" dirty="0"/>
             </a:br>
             <a:r>
-              <a:rPr lang="en-SG" dirty="0" smtClean="0"/>
+              <a:rPr lang="en-SG" dirty="0"/>
               <a:t>most online resources don’t discuss much. “mostly plug and play”</a:t>
             </a:r>
           </a:p>
@@ -3571,15 +3562,11 @@
               <a:buAutoNum type="arabicParenR"/>
             </a:pPr>
             <a:r>
-              <a:rPr lang="en-SG" dirty="0" smtClean="0"/>
+              <a:rPr lang="en-SG" dirty="0"/>
               <a:t>Calculating ROUGE score and evaluations</a:t>
             </a:r>
-            <a:r>
-              <a:rPr lang="en-SG" dirty="0" smtClean="0"/>
-              <a:t/>
-            </a:r>
             <a:br>
-              <a:rPr lang="en-SG" dirty="0" smtClean="0"/>
+              <a:rPr lang="en-SG" dirty="0"/>
             </a:br>
             <a:endParaRPr lang="en-SG" dirty="0"/>
           </a:p>
@@ -3639,10 +3626,9 @@
           <a:lstStyle/>
           <a:p>
             <a:r>
-              <a:rPr lang="en-SG" dirty="0" smtClean="0"/>
+              <a:rPr lang="en-SG" dirty="0"/>
               <a:t>Why we ROUGE instead of BLEU</a:t>
             </a:r>
-            <a:endParaRPr lang="en-SG" dirty="0"/>
           </a:p>
         </p:txBody>
       </p:sp>
@@ -3659,46 +3645,38 @@
         <p:spPr/>
         <p:txBody>
           <a:bodyPr>
-            <a:normAutofit lnSpcReduction="10000"/>
+            <a:normAutofit/>
           </a:bodyPr>
           <a:lstStyle/>
           <a:p>
             <a:r>
-              <a:rPr lang="en-SG" dirty="0" smtClean="0"/>
+              <a:rPr lang="en-SG" dirty="0"/>
               <a:t>Aim: to compare against BERT generated summary against user summary</a:t>
             </a:r>
           </a:p>
           <a:p>
-            <a:endParaRPr lang="en-SG" dirty="0" smtClean="0"/>
-          </a:p>
-          <a:p>
-            <a:r>
-              <a:rPr lang="en-SG" dirty="0" smtClean="0"/>
+            <a:r>
+              <a:rPr lang="en-SG" dirty="0"/>
               <a:t>Generally they work the same using n-grams, and a variation of recall and precision</a:t>
             </a:r>
-            <a:endParaRPr lang="en-SG" dirty="0"/>
-          </a:p>
-          <a:p>
-            <a:r>
-              <a:rPr lang="en-SG" dirty="0" smtClean="0"/>
+          </a:p>
+          <a:p>
+            <a:r>
+              <a:rPr lang="en-SG" dirty="0"/>
               <a:t>ROUGE provide us the recall, precision and the F-score which give us insight on whether the BERT summary is too vague or too rich.</a:t>
             </a:r>
           </a:p>
           <a:p>
             <a:r>
-              <a:rPr lang="en-SG" dirty="0" smtClean="0"/>
+              <a:rPr lang="en-SG" dirty="0"/>
               <a:t>F-score give a good aggregation of the results</a:t>
             </a:r>
           </a:p>
           <a:p>
-            <a:endParaRPr lang="en-SG" dirty="0" smtClean="0"/>
-          </a:p>
-          <a:p>
-            <a:r>
-              <a:rPr lang="en-SG" dirty="0" smtClean="0"/>
+            <a:r>
+              <a:rPr lang="en-SG" dirty="0"/>
               <a:t>BLEU doesn’t seem to work very well when there are differences in the summary corpus length, brevity penalty</a:t>
             </a:r>
-            <a:endParaRPr lang="en-SG" dirty="0"/>
           </a:p>
         </p:txBody>
       </p:sp>
@@ -3753,10 +3731,9 @@
           <a:lstStyle/>
           <a:p>
             <a:r>
-              <a:rPr lang="en-SG" dirty="0" smtClean="0"/>
+              <a:rPr lang="en-SG" dirty="0"/>
               <a:t>ROUGE example</a:t>
             </a:r>
-            <a:endParaRPr lang="en-SG" dirty="0"/>
           </a:p>
         </p:txBody>
       </p:sp>
@@ -3783,54 +3760,45 @@
           <a:lstStyle/>
           <a:p>
             <a:r>
-              <a:rPr lang="en-SG" dirty="0" smtClean="0"/>
+              <a:rPr lang="en-SG" dirty="0"/>
               <a:t>In this example, </a:t>
             </a:r>
           </a:p>
           <a:p>
             <a:r>
-              <a:rPr lang="en-SG" dirty="0" smtClean="0"/>
+              <a:rPr lang="en-SG" dirty="0"/>
               <a:t>BERT model highlighted : sentences 0, 1</a:t>
             </a:r>
           </a:p>
           <a:p>
             <a:r>
-              <a:rPr lang="en-SG" dirty="0" smtClean="0"/>
+              <a:rPr lang="en-SG" dirty="0"/>
               <a:t>USER highlighted: 0, 1, 2, 6</a:t>
             </a:r>
-            <a:endParaRPr lang="en-SG" dirty="0"/>
-          </a:p>
-          <a:p>
-            <a:r>
-              <a:rPr lang="en-SG" dirty="0" smtClean="0"/>
+          </a:p>
+          <a:p>
+            <a:r>
+              <a:rPr lang="en-SG" dirty="0"/>
               <a:t>We are able to gauge the correctness of the model which is 65% (relative comparison)</a:t>
             </a:r>
           </a:p>
           <a:p>
             <a:r>
-              <a:rPr lang="en-SG" dirty="0" smtClean="0"/>
+              <a:rPr lang="en-SG" dirty="0"/>
               <a:t>We know that the error is because of recall:</a:t>
-            </a:r>
-            <a:r>
-              <a:rPr lang="en-SG" dirty="0"/>
-              <a:t/>
             </a:r>
             <a:br>
               <a:rPr lang="en-SG" dirty="0"/>
             </a:br>
             <a:r>
-              <a:rPr lang="en-SG" dirty="0" smtClean="0"/>
+              <a:rPr lang="en-SG" dirty="0"/>
               <a:t>1) thus, we can increase pre-training corpus for this project </a:t>
-            </a:r>
-            <a:r>
-              <a:rPr lang="en-SG" dirty="0"/>
-              <a:t/>
             </a:r>
             <a:br>
               <a:rPr lang="en-SG" dirty="0"/>
             </a:br>
             <a:r>
-              <a:rPr lang="en-SG" dirty="0" smtClean="0"/>
+              <a:rPr lang="en-SG" dirty="0"/>
               <a:t>2) we can tweak the parameters to increase length of summary output</a:t>
             </a:r>
           </a:p>
@@ -4003,12 +3971,8 @@
           <a:lstStyle/>
           <a:p>
             <a:r>
-              <a:rPr lang="en-SG" sz="3600" dirty="0" smtClean="0"/>
-              <a:t>Wrapping up</a:t>
-            </a:r>
-            <a:r>
-              <a:rPr lang="en-SG" sz="3600" dirty="0" smtClean="0"/>
-              <a:t> </a:t>
+              <a:rPr lang="en-SG" sz="3600" dirty="0"/>
+              <a:t>Wrapping up </a:t>
             </a:r>
             <a:r>
               <a:rPr lang="en-SG" sz="3600" dirty="0">
@@ -4020,27 +3984,21 @@
           </a:p>
           <a:p>
             <a:r>
-              <a:rPr lang="en-SG" sz="3600" dirty="0" smtClean="0"/>
+              <a:rPr lang="en-SG" sz="3600" dirty="0"/>
               <a:t>Documentation</a:t>
             </a:r>
-            <a:endParaRPr lang="en-SG" sz="3600" dirty="0"/>
           </a:p>
           <a:p>
             <a:r>
               <a:rPr lang="en-SG" sz="3600" dirty="0"/>
-              <a:t>Deployment: </a:t>
-            </a:r>
-            <a:r>
-              <a:rPr lang="en-SG" sz="3600" dirty="0" smtClean="0"/>
-              <a:t>cleaning up error messages</a:t>
-            </a:r>
-          </a:p>
-          <a:p>
-            <a:r>
-              <a:rPr lang="en-SG" sz="3600" dirty="0" smtClean="0"/>
+              <a:t>Deployment: cleaning up error messages</a:t>
+            </a:r>
+          </a:p>
+          <a:p>
+            <a:r>
+              <a:rPr lang="en-SG" sz="3600" dirty="0"/>
               <a:t>Prepping for the internal presentation </a:t>
             </a:r>
-            <a:endParaRPr lang="en-SG" sz="3600" dirty="0"/>
           </a:p>
           <a:p>
             <a:endParaRPr lang="en-SG" sz="3600" dirty="0"/>
@@ -4352,7 +4310,7 @@
   <a:extraClrSchemeLst/>
   <a:extLst>
     <a:ext uri="{05A4C25C-085E-4340-85A3-A5531E510DB2}">
-      <thm15:themeFamily xmlns:thm15="http://schemas.microsoft.com/office/thememl/2012/main" xmlns="" name="Office Theme" id="{62F939B6-93AF-4DB8-9C6B-D6C7DFDC589F}" vid="{4A3C46E8-61CC-4603-A589-7422A47A8E4A}"/>
+      <thm15:themeFamily xmlns:thm15="http://schemas.microsoft.com/office/thememl/2012/main" name="Office Theme" id="{62F939B6-93AF-4DB8-9C6B-D6C7DFDC589F}" vid="{4A3C46E8-61CC-4603-A589-7422A47A8E4A}"/>
     </a:ext>
   </a:extLst>
 </a:theme>

</xml_diff>